<commit_message>
Last Update 11-07-2019 16:46:37.90
</commit_message>
<xml_diff>
--- a/Presentations/Unit 2/CS8392-U2-2-Inheritance in Java.pptx
+++ b/Presentations/Unit 2/CS8392-U2-2-Inheritance in Java.pptx
@@ -206,7 +206,7 @@
             <a:fld id="{9515075B-F3F0-4441-A1BD-B7B515B708FF}" type="datetimeFigureOut">
               <a:rPr lang="en-US" smtClean="0"/>
               <a:pPr/>
-              <a:t>7/31/2018</a:t>
+              <a:t>7/2/2019</a:t>
             </a:fld>
             <a:endParaRPr lang="en-US"/>
           </a:p>
@@ -661,7 +661,7 @@
             <a:fld id="{6E658DF8-B8C0-4C7F-85EB-B53A2DDD44A9}" type="datetimeFigureOut">
               <a:rPr lang="en-US" smtClean="0"/>
               <a:pPr/>
-              <a:t>7/31/2018</a:t>
+              <a:t>7/2/2019</a:t>
             </a:fld>
             <a:endParaRPr lang="en-US"/>
           </a:p>
@@ -828,7 +828,7 @@
             <a:fld id="{6E658DF8-B8C0-4C7F-85EB-B53A2DDD44A9}" type="datetimeFigureOut">
               <a:rPr lang="en-US" smtClean="0"/>
               <a:pPr/>
-              <a:t>7/31/2018</a:t>
+              <a:t>7/2/2019</a:t>
             </a:fld>
             <a:endParaRPr lang="en-US"/>
           </a:p>
@@ -1005,7 +1005,7 @@
             <a:fld id="{6E658DF8-B8C0-4C7F-85EB-B53A2DDD44A9}" type="datetimeFigureOut">
               <a:rPr lang="en-US" smtClean="0"/>
               <a:pPr/>
-              <a:t>7/31/2018</a:t>
+              <a:t>7/2/2019</a:t>
             </a:fld>
             <a:endParaRPr lang="en-US"/>
           </a:p>
@@ -1204,7 +1204,7 @@
             <a:fld id="{6E658DF8-B8C0-4C7F-85EB-B53A2DDD44A9}" type="datetimeFigureOut">
               <a:rPr lang="en-US" smtClean="0"/>
               <a:pPr/>
-              <a:t>7/31/2018</a:t>
+              <a:t>7/2/2019</a:t>
             </a:fld>
             <a:endParaRPr lang="en-US"/>
           </a:p>
@@ -1447,7 +1447,7 @@
             <a:fld id="{6E658DF8-B8C0-4C7F-85EB-B53A2DDD44A9}" type="datetimeFigureOut">
               <a:rPr lang="en-US" smtClean="0"/>
               <a:pPr/>
-              <a:t>7/31/2018</a:t>
+              <a:t>7/2/2019</a:t>
             </a:fld>
             <a:endParaRPr lang="en-US"/>
           </a:p>
@@ -1732,7 +1732,7 @@
             <a:fld id="{6E658DF8-B8C0-4C7F-85EB-B53A2DDD44A9}" type="datetimeFigureOut">
               <a:rPr lang="en-US" smtClean="0"/>
               <a:pPr/>
-              <a:t>7/31/2018</a:t>
+              <a:t>7/2/2019</a:t>
             </a:fld>
             <a:endParaRPr lang="en-US"/>
           </a:p>
@@ -2151,7 +2151,7 @@
             <a:fld id="{6E658DF8-B8C0-4C7F-85EB-B53A2DDD44A9}" type="datetimeFigureOut">
               <a:rPr lang="en-US" smtClean="0"/>
               <a:pPr/>
-              <a:t>7/31/2018</a:t>
+              <a:t>7/2/2019</a:t>
             </a:fld>
             <a:endParaRPr lang="en-US"/>
           </a:p>
@@ -2266,7 +2266,7 @@
             <a:fld id="{6E658DF8-B8C0-4C7F-85EB-B53A2DDD44A9}" type="datetimeFigureOut">
               <a:rPr lang="en-US" smtClean="0"/>
               <a:pPr/>
-              <a:t>7/31/2018</a:t>
+              <a:t>7/2/2019</a:t>
             </a:fld>
             <a:endParaRPr lang="en-US"/>
           </a:p>
@@ -2358,7 +2358,7 @@
             <a:fld id="{6E658DF8-B8C0-4C7F-85EB-B53A2DDD44A9}" type="datetimeFigureOut">
               <a:rPr lang="en-US" smtClean="0"/>
               <a:pPr/>
-              <a:t>7/31/2018</a:t>
+              <a:t>7/2/2019</a:t>
             </a:fld>
             <a:endParaRPr lang="en-US"/>
           </a:p>
@@ -2632,7 +2632,7 @@
             <a:fld id="{6E658DF8-B8C0-4C7F-85EB-B53A2DDD44A9}" type="datetimeFigureOut">
               <a:rPr lang="en-US" smtClean="0"/>
               <a:pPr/>
-              <a:t>7/31/2018</a:t>
+              <a:t>7/2/2019</a:t>
             </a:fld>
             <a:endParaRPr lang="en-US"/>
           </a:p>
@@ -2882,7 +2882,7 @@
             <a:fld id="{6E658DF8-B8C0-4C7F-85EB-B53A2DDD44A9}" type="datetimeFigureOut">
               <a:rPr lang="en-US" smtClean="0"/>
               <a:pPr/>
-              <a:t>7/31/2018</a:t>
+              <a:t>7/2/2019</a:t>
             </a:fld>
             <a:endParaRPr lang="en-US"/>
           </a:p>
@@ -3098,7 +3098,7 @@
             <a:fld id="{6E658DF8-B8C0-4C7F-85EB-B53A2DDD44A9}" type="datetimeFigureOut">
               <a:rPr lang="en-US" smtClean="0"/>
               <a:pPr/>
-              <a:t>7/31/2018</a:t>
+              <a:t>7/2/2019</a:t>
             </a:fld>
             <a:endParaRPr lang="en-US"/>
           </a:p>
@@ -6495,22 +6495,18 @@
               <a:rPr lang="en-US" dirty="0" smtClean="0"/>
               <a:t>Indirectly achieved</a:t>
             </a:r>
+          </a:p>
+          <a:p>
+            <a:pPr lvl="1"/>
+            <a:r>
+              <a:rPr lang="en-US" dirty="0" smtClean="0"/>
+              <a:t>Multiple </a:t>
+            </a:r>
+            <a:r>
+              <a:rPr lang="en-US" dirty="0" smtClean="0"/>
+              <a:t>Inheritance</a:t>
+            </a:r>
             <a:endParaRPr lang="en-US" dirty="0" smtClean="0"/>
-          </a:p>
-          <a:p>
-            <a:pPr lvl="1"/>
-            <a:r>
-              <a:rPr lang="en-US" dirty="0" smtClean="0"/>
-              <a:t>Multiple Inheritance</a:t>
-            </a:r>
-          </a:p>
-          <a:p>
-            <a:pPr lvl="1"/>
-            <a:r>
-              <a:rPr lang="en-US" dirty="0" smtClean="0"/>
-              <a:t>Multilevel Inheritance</a:t>
-            </a:r>
-            <a:endParaRPr lang="en-US" dirty="0"/>
           </a:p>
         </p:txBody>
       </p:sp>

</xml_diff>